<commit_message>
Added Bootrap course materials
</commit_message>
<xml_diff>
--- a/9. HTML 5, CSS3 with Bootstrap 4, JavaScript ES6/2. CSS3/Slides/6. Transforms/css3-m6-transforms-slides.pptx
+++ b/9. HTML 5, CSS3 with Bootstrap 4, JavaScript ES6/2. CSS3/Slides/6. Transforms/css3-m6-transforms-slides.pptx
@@ -5,21 +5,21 @@
     <p:sldMasterId id="2147483648" r:id="rId1"/>
   </p:sldMasterIdLst>
   <p:notesMasterIdLst>
-    <p:notesMasterId r:id="rId14"/>
+    <p:notesMasterId r:id="rId15"/>
   </p:notesMasterIdLst>
   <p:sldIdLst>
-    <p:sldId id="256" r:id="rId2"/>
-    <p:sldId id="257" r:id="rId3"/>
-    <p:sldId id="258" r:id="rId4"/>
-    <p:sldId id="259" r:id="rId5"/>
-    <p:sldId id="260" r:id="rId6"/>
-    <p:sldId id="261" r:id="rId7"/>
-    <p:sldId id="262" r:id="rId8"/>
-    <p:sldId id="263" r:id="rId9"/>
-    <p:sldId id="264" r:id="rId10"/>
-    <p:sldId id="265" r:id="rId11"/>
-    <p:sldId id="266" r:id="rId12"/>
-    <p:sldId id="267" r:id="rId13"/>
+    <p:sldId id="256" r:id="rId3"/>
+    <p:sldId id="257" r:id="rId4"/>
+    <p:sldId id="258" r:id="rId5"/>
+    <p:sldId id="259" r:id="rId6"/>
+    <p:sldId id="260" r:id="rId7"/>
+    <p:sldId id="261" r:id="rId8"/>
+    <p:sldId id="262" r:id="rId9"/>
+    <p:sldId id="263" r:id="rId10"/>
+    <p:sldId id="264" r:id="rId11"/>
+    <p:sldId id="265" r:id="rId12"/>
+    <p:sldId id="266" r:id="rId13"/>
+    <p:sldId id="267" r:id="rId14"/>
   </p:sldIdLst>
   <p:sldSz cx="9144000" cy="6858000" type="screen4x3"/>
   <p:notesSz cx="9144000" cy="6858000"/>
@@ -203,7 +203,6 @@
           <a:p>
             <a:fld id="{88B7A174-8887-4A28-96CC-42CC1E3F39B7}" type="datetimeFigureOut">
               <a:rPr lang="en-US" smtClean="0"/>
-              <a:t>6/26/2021</a:t>
             </a:fld>
             <a:endParaRPr lang="en-US"/>
           </a:p>
@@ -272,6 +271,7 @@
               <a:rPr lang="en-US" smtClean="0"/>
               <a:t>Click to edit Master text styles</a:t>
             </a:r>
+            <a:endParaRPr lang="en-US" smtClean="0"/>
           </a:p>
           <a:p>
             <a:pPr lvl="1"/>
@@ -279,6 +279,7 @@
               <a:rPr lang="en-US" smtClean="0"/>
               <a:t>Second level</a:t>
             </a:r>
+            <a:endParaRPr lang="en-US" smtClean="0"/>
           </a:p>
           <a:p>
             <a:pPr lvl="2"/>
@@ -286,6 +287,7 @@
               <a:rPr lang="en-US" smtClean="0"/>
               <a:t>Third level</a:t>
             </a:r>
+            <a:endParaRPr lang="en-US" smtClean="0"/>
           </a:p>
           <a:p>
             <a:pPr lvl="3"/>
@@ -293,6 +295,7 @@
               <a:rPr lang="en-US" smtClean="0"/>
               <a:t>Fourth level</a:t>
             </a:r>
+            <a:endParaRPr lang="en-US" smtClean="0"/>
           </a:p>
           <a:p>
             <a:pPr lvl="4"/>
@@ -364,7 +367,6 @@
           <a:p>
             <a:fld id="{455492F0-4DB8-4376-920A-A649D492514D}" type="slidenum">
               <a:rPr lang="en-US" smtClean="0"/>
-              <a:t>‹#›</a:t>
             </a:fld>
             <a:endParaRPr lang="en-US"/>
           </a:p>
@@ -514,14 +516,12 @@
                 <a:solidFill>
                   <a:schemeClr val="tx1"/>
                 </a:solidFill>
-                <a:latin typeface="Arial"/>
-                <a:cs typeface="Arial"/>
+                <a:latin typeface="Arial" panose="020B0604020202020204"/>
+                <a:cs typeface="Arial" panose="020B0604020202020204"/>
               </a:defRPr>
             </a:lvl1pPr>
           </a:lstStyle>
-          <a:p>
-            <a:endParaRPr/>
-          </a:p>
+          <a:p/>
         </p:txBody>
       </p:sp>
       <p:sp>
@@ -552,9 +552,7 @@
               <a:defRPr/>
             </a:lvl1pPr>
           </a:lstStyle>
-          <a:p>
-            <a:endParaRPr/>
-          </a:p>
+          <a:p/>
         </p:txBody>
       </p:sp>
       <p:sp>
@@ -581,9 +579,7 @@
               </a:defRPr>
             </a:lvl1pPr>
           </a:lstStyle>
-          <a:p>
-            <a:endParaRPr/>
-          </a:p>
+          <a:p/>
         </p:txBody>
       </p:sp>
       <p:sp>
@@ -613,7 +609,6 @@
           <a:p>
             <a:fld id="{143F88FD-78BA-4819-B36D-F4E75FBD64F0}" type="datetime1">
               <a:rPr lang="en-US" smtClean="0"/>
-              <a:t>6/26/2021</a:t>
             </a:fld>
             <a:endParaRPr lang="en-US"/>
           </a:p>
@@ -646,8 +641,6 @@
           <a:p>
             <a:fld id="{B6F15528-21DE-4FAA-801E-634DDDAF4B2B}" type="slidenum">
               <a:rPr/>
-              <a:pPr/>
-              <a:t>‹#›</a:t>
             </a:fld>
             <a:endParaRPr/>
           </a:p>
@@ -697,14 +690,12 @@
                 <a:solidFill>
                   <a:schemeClr val="tx1"/>
                 </a:solidFill>
-                <a:latin typeface="Arial"/>
-                <a:cs typeface="Arial"/>
+                <a:latin typeface="Arial" panose="020B0604020202020204"/>
+                <a:cs typeface="Arial" panose="020B0604020202020204"/>
               </a:defRPr>
             </a:lvl1pPr>
           </a:lstStyle>
-          <a:p>
-            <a:endParaRPr/>
-          </a:p>
+          <a:p/>
         </p:txBody>
       </p:sp>
       <p:sp>
@@ -726,14 +717,12 @@
                 <a:solidFill>
                   <a:schemeClr val="tx1"/>
                 </a:solidFill>
-                <a:latin typeface="Consolas"/>
-                <a:cs typeface="Consolas"/>
+                <a:latin typeface="Consolas" panose="020B0609020204030204"/>
+                <a:cs typeface="Consolas" panose="020B0609020204030204"/>
               </a:defRPr>
             </a:lvl1pPr>
           </a:lstStyle>
-          <a:p>
-            <a:endParaRPr/>
-          </a:p>
+          <a:p/>
         </p:txBody>
       </p:sp>
       <p:sp>
@@ -760,9 +749,7 @@
               </a:defRPr>
             </a:lvl1pPr>
           </a:lstStyle>
-          <a:p>
-            <a:endParaRPr/>
-          </a:p>
+          <a:p/>
         </p:txBody>
       </p:sp>
       <p:sp>
@@ -792,7 +779,6 @@
           <a:p>
             <a:fld id="{41F264B6-8902-47B7-83A7-F9ACBC4DFCD0}" type="datetime1">
               <a:rPr lang="en-US" smtClean="0"/>
-              <a:t>6/26/2021</a:t>
             </a:fld>
             <a:endParaRPr lang="en-US"/>
           </a:p>
@@ -825,8 +811,6 @@
           <a:p>
             <a:fld id="{B6F15528-21DE-4FAA-801E-634DDDAF4B2B}" type="slidenum">
               <a:rPr/>
-              <a:pPr/>
-              <a:t>‹#›</a:t>
             </a:fld>
             <a:endParaRPr/>
           </a:p>
@@ -876,14 +860,12 @@
                 <a:solidFill>
                   <a:schemeClr val="tx1"/>
                 </a:solidFill>
-                <a:latin typeface="Arial"/>
-                <a:cs typeface="Arial"/>
+                <a:latin typeface="Arial" panose="020B0604020202020204"/>
+                <a:cs typeface="Arial" panose="020B0604020202020204"/>
               </a:defRPr>
             </a:lvl1pPr>
           </a:lstStyle>
-          <a:p>
-            <a:endParaRPr/>
-          </a:p>
+          <a:p/>
         </p:txBody>
       </p:sp>
       <p:sp>
@@ -914,9 +896,7 @@
               <a:defRPr/>
             </a:lvl1pPr>
           </a:lstStyle>
-          <a:p>
-            <a:endParaRPr/>
-          </a:p>
+          <a:p/>
         </p:txBody>
       </p:sp>
       <p:sp>
@@ -947,9 +927,7 @@
               <a:defRPr/>
             </a:lvl1pPr>
           </a:lstStyle>
-          <a:p>
-            <a:endParaRPr/>
-          </a:p>
+          <a:p/>
         </p:txBody>
       </p:sp>
       <p:sp>
@@ -976,9 +954,7 @@
               </a:defRPr>
             </a:lvl1pPr>
           </a:lstStyle>
-          <a:p>
-            <a:endParaRPr/>
-          </a:p>
+          <a:p/>
         </p:txBody>
       </p:sp>
       <p:sp>
@@ -1008,7 +984,6 @@
           <a:p>
             <a:fld id="{8A66A45F-3524-46C6-B4EC-F7B30F940A66}" type="datetime1">
               <a:rPr lang="en-US" smtClean="0"/>
-              <a:t>6/26/2021</a:t>
             </a:fld>
             <a:endParaRPr lang="en-US"/>
           </a:p>
@@ -1041,8 +1016,6 @@
           <a:p>
             <a:fld id="{B6F15528-21DE-4FAA-801E-634DDDAF4B2B}" type="slidenum">
               <a:rPr/>
-              <a:pPr/>
-              <a:t>‹#›</a:t>
             </a:fld>
             <a:endParaRPr/>
           </a:p>
@@ -1092,14 +1065,12 @@
                 <a:solidFill>
                   <a:schemeClr val="tx1"/>
                 </a:solidFill>
-                <a:latin typeface="Arial"/>
-                <a:cs typeface="Arial"/>
+                <a:latin typeface="Arial" panose="020B0604020202020204"/>
+                <a:cs typeface="Arial" panose="020B0604020202020204"/>
               </a:defRPr>
             </a:lvl1pPr>
           </a:lstStyle>
-          <a:p>
-            <a:endParaRPr/>
-          </a:p>
+          <a:p/>
         </p:txBody>
       </p:sp>
       <p:sp>
@@ -1126,9 +1097,7 @@
               </a:defRPr>
             </a:lvl1pPr>
           </a:lstStyle>
-          <a:p>
-            <a:endParaRPr/>
-          </a:p>
+          <a:p/>
         </p:txBody>
       </p:sp>
       <p:sp>
@@ -1158,7 +1127,6 @@
           <a:p>
             <a:fld id="{38A499AE-52F6-4124-A522-B2BC60722B58}" type="datetime1">
               <a:rPr lang="en-US" smtClean="0"/>
-              <a:t>6/26/2021</a:t>
             </a:fld>
             <a:endParaRPr lang="en-US"/>
           </a:p>
@@ -1191,8 +1159,6 @@
           <a:p>
             <a:fld id="{B6F15528-21DE-4FAA-801E-634DDDAF4B2B}" type="slidenum">
               <a:rPr/>
-              <a:pPr/>
-              <a:t>‹#›</a:t>
             </a:fld>
             <a:endParaRPr/>
           </a:p>
@@ -1247,9 +1213,7 @@
               </a:defRPr>
             </a:lvl1pPr>
           </a:lstStyle>
-          <a:p>
-            <a:endParaRPr/>
-          </a:p>
+          <a:p/>
         </p:txBody>
       </p:sp>
       <p:sp>
@@ -1279,7 +1243,6 @@
           <a:p>
             <a:fld id="{653FD013-A4E2-4BA9-B440-DD8D18409D12}" type="datetime1">
               <a:rPr lang="en-US" smtClean="0"/>
-              <a:t>6/26/2021</a:t>
             </a:fld>
             <a:endParaRPr lang="en-US"/>
           </a:p>
@@ -1312,8 +1275,6 @@
           <a:p>
             <a:fld id="{B6F15528-21DE-4FAA-801E-634DDDAF4B2B}" type="slidenum">
               <a:rPr/>
-              <a:pPr/>
-              <a:t>‹#›</a:t>
             </a:fld>
             <a:endParaRPr/>
           </a:p>
@@ -1381,14 +1342,12 @@
                 <a:solidFill>
                   <a:schemeClr val="tx1"/>
                 </a:solidFill>
-                <a:latin typeface="Arial"/>
-                <a:cs typeface="Arial"/>
+                <a:latin typeface="Arial" panose="020B0604020202020204"/>
+                <a:cs typeface="Arial" panose="020B0604020202020204"/>
               </a:defRPr>
             </a:lvl1pPr>
           </a:lstStyle>
-          <a:p>
-            <a:endParaRPr/>
-          </a:p>
+          <a:p/>
         </p:txBody>
       </p:sp>
       <p:sp>
@@ -1420,14 +1379,12 @@
                 <a:solidFill>
                   <a:schemeClr val="tx1"/>
                 </a:solidFill>
-                <a:latin typeface="Consolas"/>
-                <a:cs typeface="Consolas"/>
+                <a:latin typeface="Consolas" panose="020B0609020204030204"/>
+                <a:cs typeface="Consolas" panose="020B0609020204030204"/>
               </a:defRPr>
             </a:lvl1pPr>
           </a:lstStyle>
-          <a:p>
-            <a:endParaRPr/>
-          </a:p>
+          <a:p/>
         </p:txBody>
       </p:sp>
       <p:sp>
@@ -1464,9 +1421,7 @@
               </a:defRPr>
             </a:lvl1pPr>
           </a:lstStyle>
-          <a:p>
-            <a:endParaRPr/>
-          </a:p>
+          <a:p/>
         </p:txBody>
       </p:sp>
       <p:sp>
@@ -1506,7 +1461,6 @@
           <a:p>
             <a:fld id="{359C6C0E-14E2-4D48-8E18-7AF8301E7916}" type="datetime1">
               <a:rPr lang="en-US" smtClean="0"/>
-              <a:t>6/26/2021</a:t>
             </a:fld>
             <a:endParaRPr lang="en-US"/>
           </a:p>
@@ -1549,8 +1503,6 @@
           <a:p>
             <a:fld id="{B6F15528-21DE-4FAA-801E-634DDDAF4B2B}" type="slidenum">
               <a:rPr/>
-              <a:pPr/>
-              <a:t>‹#›</a:t>
             </a:fld>
             <a:endParaRPr/>
           </a:p>
@@ -1560,11 +1512,11 @@
   </p:cSld>
   <p:clrMap bg1="lt1" tx1="dk1" bg2="lt2" tx2="dk2" accent1="accent1" accent2="accent2" accent3="accent3" accent4="accent4" accent5="accent5" accent6="accent6" hlink="hlink" folHlink="folHlink"/>
   <p:sldLayoutIdLst>
-    <p:sldLayoutId id="2147483661" r:id="rId1"/>
-    <p:sldLayoutId id="2147483662" r:id="rId2"/>
-    <p:sldLayoutId id="2147483663" r:id="rId3"/>
-    <p:sldLayoutId id="2147483664" r:id="rId4"/>
-    <p:sldLayoutId id="2147483665" r:id="rId5"/>
+    <p:sldLayoutId id="2147483649" r:id="rId1"/>
+    <p:sldLayoutId id="2147483650" r:id="rId2"/>
+    <p:sldLayoutId id="2147483651" r:id="rId3"/>
+    <p:sldLayoutId id="2147483652" r:id="rId4"/>
+    <p:sldLayoutId id="2147483653" r:id="rId5"/>
   </p:sldLayoutIdLst>
   <p:hf hdr="0" ftr="0" dt="0"/>
   <p:txStyles>
@@ -1759,14 +1711,14 @@
             </a:pPr>
             <a:r>
               <a:rPr sz="3200" b="1" dirty="0">
-                <a:latin typeface="Arial"/>
-                <a:cs typeface="Arial"/>
+                <a:latin typeface="Arial" panose="020B0604020202020204"/>
+                <a:cs typeface="Arial" panose="020B0604020202020204"/>
               </a:rPr>
               <a:t>CSS3:</a:t>
             </a:r>
             <a:endParaRPr sz="3200">
-              <a:latin typeface="Arial"/>
-              <a:cs typeface="Arial"/>
+              <a:latin typeface="Arial" panose="020B0604020202020204"/>
+              <a:cs typeface="Arial" panose="020B0604020202020204"/>
             </a:endParaRPr>
           </a:p>
           <a:p>
@@ -1777,14 +1729,14 @@
             </a:pPr>
             <a:r>
               <a:rPr sz="3200" b="1" spc="-5" dirty="0">
-                <a:latin typeface="Arial"/>
-                <a:cs typeface="Arial"/>
+                <a:latin typeface="Arial" panose="020B0604020202020204"/>
+                <a:cs typeface="Arial" panose="020B0604020202020204"/>
               </a:rPr>
               <a:t>Transforms</a:t>
             </a:r>
             <a:endParaRPr sz="3200">
-              <a:latin typeface="Arial"/>
-              <a:cs typeface="Arial"/>
+              <a:latin typeface="Arial" panose="020B0604020202020204"/>
+              <a:cs typeface="Arial" panose="020B0604020202020204"/>
             </a:endParaRPr>
           </a:p>
         </p:txBody>
@@ -1798,7 +1750,7 @@
           <p:nvPr/>
         </p:nvPicPr>
         <p:blipFill>
-          <a:blip r:embed="rId2"/>
+          <a:blip r:embed="rId1"/>
           <a:srcRect/>
           <a:stretch>
             <a:fillRect/>
@@ -1839,8 +1791,6 @@
           <a:p>
             <a:fld id="{B6F15528-21DE-4FAA-801E-634DDDAF4B2B}" type="slidenum">
               <a:rPr lang="en-US" smtClean="0"/>
-              <a:pPr/>
-              <a:t>1</a:t>
             </a:fld>
             <a:endParaRPr lang="en-US"/>
           </a:p>
@@ -1908,6 +1858,7 @@
               <a:rPr spc="-5" dirty="0"/>
               <a:t>Translate</a:t>
             </a:r>
+            <a:endParaRPr spc="-5" dirty="0"/>
           </a:p>
         </p:txBody>
       </p:sp>
@@ -1970,9 +1921,7 @@
           <p:txBody>
             <a:bodyPr wrap="square" lIns="0" tIns="0" rIns="0" bIns="0" rtlCol="0"/>
             <a:lstStyle/>
-            <a:p>
-              <a:endParaRPr/>
-            </a:p>
+            <a:p/>
           </p:txBody>
         </p:sp>
         <p:sp>
@@ -2022,9 +1971,7 @@
           <p:txBody>
             <a:bodyPr wrap="square" lIns="0" tIns="0" rIns="0" bIns="0" rtlCol="0"/>
             <a:lstStyle/>
-            <a:p>
-              <a:endParaRPr/>
-            </a:p>
+            <a:p/>
           </p:txBody>
         </p:sp>
       </p:grpSp>
@@ -2036,7 +1983,7 @@
         </p:nvSpPr>
         <p:spPr>
           <a:xfrm>
-            <a:off x="3554582" y="1954783"/>
+            <a:off x="3554582" y="2259583"/>
             <a:ext cx="1898650" cy="299720"/>
           </a:xfrm>
           <a:prstGeom prst="rect">
@@ -2059,14 +2006,14 @@
             </a:pPr>
             <a:r>
               <a:rPr sz="1800" dirty="0">
-                <a:latin typeface="Consolas"/>
-                <a:cs typeface="Consolas"/>
+                <a:latin typeface="Consolas" panose="020B0609020204030204"/>
+                <a:cs typeface="Consolas" panose="020B0609020204030204"/>
               </a:rPr>
               <a:t>translate(3em);</a:t>
             </a:r>
             <a:endParaRPr sz="1800">
-              <a:latin typeface="Consolas"/>
-              <a:cs typeface="Consolas"/>
+              <a:latin typeface="Consolas" panose="020B0609020204030204"/>
+              <a:cs typeface="Consolas" panose="020B0609020204030204"/>
             </a:endParaRPr>
           </a:p>
         </p:txBody>
@@ -2094,7 +2041,7 @@
           <a:p>
             <a:pPr marL="342265" marR="5080" indent="-342900">
               <a:lnSpc>
-                <a:spcPct val="117200"/>
+                <a:spcPct val="117000"/>
               </a:lnSpc>
               <a:spcBef>
                 <a:spcPts val="100"/>
@@ -2102,28 +2049,28 @@
             </a:pPr>
             <a:r>
               <a:rPr sz="1800" dirty="0">
-                <a:latin typeface="Consolas"/>
-                <a:cs typeface="Consolas"/>
+                <a:latin typeface="Consolas" panose="020B0609020204030204"/>
+                <a:cs typeface="Consolas" panose="020B0609020204030204"/>
               </a:rPr>
               <a:t>.moveRight { </a:t>
             </a:r>
             <a:r>
               <a:rPr sz="1800" spc="-975" dirty="0">
-                <a:latin typeface="Consolas"/>
-                <a:cs typeface="Consolas"/>
+                <a:latin typeface="Consolas" panose="020B0609020204030204"/>
+                <a:cs typeface="Consolas" panose="020B0609020204030204"/>
               </a:rPr>
               <a:t> </a:t>
             </a:r>
             <a:r>
               <a:rPr sz="1800" dirty="0">
-                <a:latin typeface="Consolas"/>
-                <a:cs typeface="Consolas"/>
+                <a:latin typeface="Consolas" panose="020B0609020204030204"/>
+                <a:cs typeface="Consolas" panose="020B0609020204030204"/>
               </a:rPr>
               <a:t>transform:</a:t>
             </a:r>
             <a:endParaRPr sz="1800">
-              <a:latin typeface="Consolas"/>
-              <a:cs typeface="Consolas"/>
+              <a:latin typeface="Consolas" panose="020B0609020204030204"/>
+              <a:cs typeface="Consolas" panose="020B0609020204030204"/>
             </a:endParaRPr>
           </a:p>
           <a:p>
@@ -2137,14 +2084,14 @@
             </a:pPr>
             <a:r>
               <a:rPr sz="1800" dirty="0">
-                <a:latin typeface="Consolas"/>
-                <a:cs typeface="Consolas"/>
+                <a:latin typeface="Consolas" panose="020B0609020204030204"/>
+                <a:cs typeface="Consolas" panose="020B0609020204030204"/>
               </a:rPr>
               <a:t>}</a:t>
             </a:r>
             <a:endParaRPr sz="1800">
-              <a:latin typeface="Consolas"/>
-              <a:cs typeface="Consolas"/>
+              <a:latin typeface="Consolas" panose="020B0609020204030204"/>
+              <a:cs typeface="Consolas" panose="020B0609020204030204"/>
             </a:endParaRPr>
           </a:p>
         </p:txBody>
@@ -2172,7 +2119,7 @@
           <a:p>
             <a:pPr marL="342265" marR="507365" indent="-342900">
               <a:lnSpc>
-                <a:spcPct val="120400"/>
+                <a:spcPct val="120000"/>
               </a:lnSpc>
               <a:spcBef>
                 <a:spcPts val="100"/>
@@ -2205,6 +2152,7 @@
               <a:rPr spc="-110" dirty="0"/>
               <a:t>translate(-­‐3em);</a:t>
             </a:r>
+            <a:endParaRPr spc="-110" dirty="0"/>
           </a:p>
           <a:p>
             <a:pPr>
@@ -2212,13 +2160,14 @@
                 <a:spcPct val="100000"/>
               </a:lnSpc>
               <a:spcBef>
-                <a:spcPts val="439"/>
+                <a:spcPts val="440"/>
               </a:spcBef>
             </a:pPr>
             <a:r>
               <a:rPr dirty="0"/>
               <a:t>}</a:t>
             </a:r>
+            <a:endParaRPr dirty="0"/>
           </a:p>
           <a:p>
             <a:pPr>
@@ -2226,7 +2175,7 @@
                 <a:spcPct val="100000"/>
               </a:lnSpc>
               <a:spcBef>
-                <a:spcPts val="439"/>
+                <a:spcPts val="440"/>
               </a:spcBef>
             </a:pPr>
             <a:r>
@@ -2241,6 +2190,7 @@
               <a:rPr dirty="0"/>
               <a:t>{</a:t>
             </a:r>
+            <a:endParaRPr dirty="0"/>
           </a:p>
           <a:p>
             <a:pPr marL="342265">
@@ -2248,7 +2198,7 @@
                 <a:spcPct val="100000"/>
               </a:lnSpc>
               <a:spcBef>
-                <a:spcPts val="439"/>
+                <a:spcPts val="440"/>
               </a:spcBef>
               <a:tabLst>
                 <a:tab pos="1976755" algn="l"/>
@@ -2266,6 +2216,7 @@
               <a:rPr dirty="0"/>
               <a:t>3em);</a:t>
             </a:r>
+            <a:endParaRPr dirty="0"/>
           </a:p>
           <a:p>
             <a:pPr>
@@ -2273,13 +2224,14 @@
                 <a:spcPct val="100000"/>
               </a:lnSpc>
               <a:spcBef>
-                <a:spcPts val="439"/>
+                <a:spcPts val="440"/>
               </a:spcBef>
             </a:pPr>
             <a:r>
               <a:rPr dirty="0"/>
               <a:t>}</a:t>
             </a:r>
+            <a:endParaRPr dirty="0"/>
           </a:p>
           <a:p>
             <a:pPr>
@@ -2302,6 +2254,7 @@
               <a:rPr dirty="0"/>
               <a:t>{</a:t>
             </a:r>
+            <a:endParaRPr dirty="0"/>
           </a:p>
           <a:p>
             <a:pPr marL="342265">
@@ -2309,7 +2262,7 @@
                 <a:spcPct val="100000"/>
               </a:lnSpc>
               <a:spcBef>
-                <a:spcPts val="439"/>
+                <a:spcPts val="440"/>
               </a:spcBef>
               <a:tabLst>
                 <a:tab pos="1976120" algn="l"/>
@@ -2323,6 +2276,7 @@
               <a:rPr spc="-105" dirty="0"/>
               <a:t>translateY(-­‐3em);</a:t>
             </a:r>
+            <a:endParaRPr spc="-105" dirty="0"/>
           </a:p>
           <a:p>
             <a:pPr>
@@ -2330,13 +2284,14 @@
                 <a:spcPct val="100000"/>
               </a:lnSpc>
               <a:spcBef>
-                <a:spcPts val="439"/>
+                <a:spcPts val="440"/>
               </a:spcBef>
             </a:pPr>
             <a:r>
               <a:rPr dirty="0"/>
               <a:t>}</a:t>
             </a:r>
+            <a:endParaRPr dirty="0"/>
           </a:p>
         </p:txBody>
       </p:sp>
@@ -2357,8 +2312,6 @@
           <a:p>
             <a:fld id="{B6F15528-21DE-4FAA-801E-634DDDAF4B2B}" type="slidenum">
               <a:rPr lang="en-US" smtClean="0"/>
-              <a:pPr/>
-              <a:t>10</a:t>
             </a:fld>
             <a:endParaRPr lang="en-US"/>
           </a:p>
@@ -2446,6 +2399,7 @@
               <a:rPr spc="-5" dirty="0"/>
               <a:t>Site</a:t>
             </a:r>
+            <a:endParaRPr spc="-5" dirty="0"/>
           </a:p>
         </p:txBody>
       </p:sp>
@@ -2602,9 +2556,7 @@
         <p:txBody>
           <a:bodyPr wrap="square" lIns="0" tIns="0" rIns="0" bIns="0" rtlCol="0"/>
           <a:lstStyle/>
-          <a:p>
-            <a:endParaRPr/>
-          </a:p>
+          <a:p/>
         </p:txBody>
       </p:sp>
       <p:sp>
@@ -2641,14 +2593,14 @@
                 <a:solidFill>
                   <a:srgbClr val="FFFFFF"/>
                 </a:solidFill>
-                <a:latin typeface="Arial"/>
-                <a:cs typeface="Arial"/>
+                <a:latin typeface="Arial" panose="020B0604020202020204"/>
+                <a:cs typeface="Arial" panose="020B0604020202020204"/>
               </a:rPr>
               <a:t>DEMO</a:t>
             </a:r>
             <a:endParaRPr sz="6500">
-              <a:latin typeface="Arial"/>
-              <a:cs typeface="Arial"/>
+              <a:latin typeface="Arial" panose="020B0604020202020204"/>
+              <a:cs typeface="Arial" panose="020B0604020202020204"/>
             </a:endParaRPr>
           </a:p>
         </p:txBody>
@@ -2670,8 +2622,6 @@
           <a:p>
             <a:fld id="{B6F15528-21DE-4FAA-801E-634DDDAF4B2B}" type="slidenum">
               <a:rPr lang="en-US" smtClean="0"/>
-              <a:pPr/>
-              <a:t>11</a:t>
             </a:fld>
             <a:endParaRPr lang="en-US"/>
           </a:p>
@@ -2735,6 +2685,7 @@
               <a:rPr spc="-5" dirty="0"/>
               <a:t>Summary</a:t>
             </a:r>
+            <a:endParaRPr spc="-5" dirty="0"/>
           </a:p>
         </p:txBody>
       </p:sp>
@@ -2766,7 +2717,7 @@
               <a:spcBef>
                 <a:spcPts val="580"/>
               </a:spcBef>
-              <a:buFont typeface="Wingdings"/>
+              <a:buFont typeface="Wingdings" panose="05000000000000000000"/>
               <a:buChar char=""/>
               <a:tabLst>
                 <a:tab pos="354965" algn="l"/>
@@ -2775,112 +2726,112 @@
             </a:pPr>
             <a:r>
               <a:rPr sz="2000" b="1" spc="-5" dirty="0">
-                <a:latin typeface="Arial"/>
-                <a:cs typeface="Arial"/>
+                <a:latin typeface="Arial" panose="020B0604020202020204"/>
+                <a:cs typeface="Arial" panose="020B0604020202020204"/>
               </a:rPr>
               <a:t>Change</a:t>
             </a:r>
             <a:r>
               <a:rPr sz="2000" b="1" dirty="0">
-                <a:latin typeface="Arial"/>
-                <a:cs typeface="Arial"/>
+                <a:latin typeface="Arial" panose="020B0604020202020204"/>
+                <a:cs typeface="Arial" panose="020B0604020202020204"/>
               </a:rPr>
               <a:t> </a:t>
             </a:r>
             <a:r>
               <a:rPr sz="2000" b="1" spc="-5" dirty="0">
-                <a:latin typeface="Arial"/>
-                <a:cs typeface="Arial"/>
+                <a:latin typeface="Arial" panose="020B0604020202020204"/>
+                <a:cs typeface="Arial" panose="020B0604020202020204"/>
               </a:rPr>
               <a:t>the</a:t>
             </a:r>
             <a:r>
               <a:rPr sz="2000" b="1" spc="5" dirty="0">
-                <a:latin typeface="Arial"/>
-                <a:cs typeface="Arial"/>
+                <a:latin typeface="Arial" panose="020B0604020202020204"/>
+                <a:cs typeface="Arial" panose="020B0604020202020204"/>
               </a:rPr>
               <a:t> </a:t>
             </a:r>
             <a:r>
               <a:rPr sz="2000" b="1" spc="-5" dirty="0">
-                <a:latin typeface="Arial"/>
-                <a:cs typeface="Arial"/>
+                <a:latin typeface="Arial" panose="020B0604020202020204"/>
+                <a:cs typeface="Arial" panose="020B0604020202020204"/>
               </a:rPr>
               <a:t>visual</a:t>
             </a:r>
             <a:r>
               <a:rPr sz="2000" b="1" dirty="0">
-                <a:latin typeface="Arial"/>
-                <a:cs typeface="Arial"/>
+                <a:latin typeface="Arial" panose="020B0604020202020204"/>
+                <a:cs typeface="Arial" panose="020B0604020202020204"/>
               </a:rPr>
               <a:t> </a:t>
             </a:r>
             <a:r>
               <a:rPr sz="2000" b="1" spc="-5" dirty="0">
-                <a:latin typeface="Arial"/>
-                <a:cs typeface="Arial"/>
+                <a:latin typeface="Arial" panose="020B0604020202020204"/>
+                <a:cs typeface="Arial" panose="020B0604020202020204"/>
               </a:rPr>
               <a:t>presentation</a:t>
             </a:r>
             <a:r>
               <a:rPr sz="2000" b="1" dirty="0">
-                <a:latin typeface="Arial"/>
-                <a:cs typeface="Arial"/>
+                <a:latin typeface="Arial" panose="020B0604020202020204"/>
+                <a:cs typeface="Arial" panose="020B0604020202020204"/>
               </a:rPr>
               <a:t> </a:t>
             </a:r>
             <a:r>
               <a:rPr sz="2000" b="1" spc="-5" dirty="0">
-                <a:latin typeface="Arial"/>
-                <a:cs typeface="Arial"/>
+                <a:latin typeface="Arial" panose="020B0604020202020204"/>
+                <a:cs typeface="Arial" panose="020B0604020202020204"/>
               </a:rPr>
               <a:t>of</a:t>
             </a:r>
             <a:r>
               <a:rPr sz="2000" b="1" dirty="0">
-                <a:latin typeface="Arial"/>
-                <a:cs typeface="Arial"/>
+                <a:latin typeface="Arial" panose="020B0604020202020204"/>
+                <a:cs typeface="Arial" panose="020B0604020202020204"/>
               </a:rPr>
               <a:t> </a:t>
             </a:r>
             <a:r>
               <a:rPr sz="2000" b="1" spc="-5" dirty="0">
-                <a:latin typeface="Arial"/>
-                <a:cs typeface="Arial"/>
+                <a:latin typeface="Arial" panose="020B0604020202020204"/>
+                <a:cs typeface="Arial" panose="020B0604020202020204"/>
               </a:rPr>
               <a:t>any</a:t>
             </a:r>
             <a:r>
               <a:rPr sz="2000" b="1" dirty="0">
-                <a:latin typeface="Arial"/>
-                <a:cs typeface="Arial"/>
+                <a:latin typeface="Arial" panose="020B0604020202020204"/>
+                <a:cs typeface="Arial" panose="020B0604020202020204"/>
               </a:rPr>
               <a:t> </a:t>
             </a:r>
             <a:r>
               <a:rPr sz="2000" b="1" spc="-5" dirty="0">
-                <a:latin typeface="Arial"/>
-                <a:cs typeface="Arial"/>
+                <a:latin typeface="Arial" panose="020B0604020202020204"/>
+                <a:cs typeface="Arial" panose="020B0604020202020204"/>
               </a:rPr>
               <a:t>element</a:t>
             </a:r>
             <a:r>
               <a:rPr sz="2000" b="1" dirty="0">
-                <a:latin typeface="Arial"/>
-                <a:cs typeface="Arial"/>
+                <a:latin typeface="Arial" panose="020B0604020202020204"/>
+                <a:cs typeface="Arial" panose="020B0604020202020204"/>
               </a:rPr>
               <a:t> </a:t>
             </a:r>
             <a:r>
               <a:rPr sz="2000" b="1" spc="-5" dirty="0">
-                <a:latin typeface="Arial"/>
-                <a:cs typeface="Arial"/>
+                <a:latin typeface="Arial" panose="020B0604020202020204"/>
+                <a:cs typeface="Arial" panose="020B0604020202020204"/>
               </a:rPr>
               <a:t>by</a:t>
             </a:r>
             <a:endParaRPr sz="2000">
-              <a:latin typeface="Arial"/>
-              <a:cs typeface="Arial"/>
+              <a:latin typeface="Arial" panose="020B0604020202020204"/>
+              <a:cs typeface="Arial" panose="020B0604020202020204"/>
             </a:endParaRPr>
           </a:p>
           <a:p>
@@ -2892,7 +2843,7 @@
                 <a:spcPts val="430"/>
               </a:spcBef>
               <a:buSzPct val="50000"/>
-              <a:buFont typeface="Wingdings"/>
+              <a:buFont typeface="Wingdings" panose="05000000000000000000"/>
               <a:buChar char=""/>
               <a:tabLst>
                 <a:tab pos="755015" algn="l"/>
@@ -2920,7 +2871,7 @@
                 <a:spcPts val="340"/>
               </a:spcBef>
               <a:buSzPct val="50000"/>
-              <a:buFont typeface="Wingdings"/>
+              <a:buFont typeface="Wingdings" panose="05000000000000000000"/>
               <a:buChar char=""/>
               <a:tabLst>
                 <a:tab pos="755015" algn="l"/>
@@ -2948,7 +2899,7 @@
                 <a:spcPts val="440"/>
               </a:spcBef>
               <a:buSzPct val="50000"/>
-              <a:buFont typeface="Wingdings"/>
+              <a:buFont typeface="Wingdings" panose="05000000000000000000"/>
               <a:buChar char=""/>
               <a:tabLst>
                 <a:tab pos="755015" algn="l"/>
@@ -2976,7 +2927,7 @@
                 <a:spcPts val="440"/>
               </a:spcBef>
               <a:buSzPct val="50000"/>
-              <a:buFont typeface="Wingdings"/>
+              <a:buFont typeface="Wingdings" panose="05000000000000000000"/>
               <a:buChar char=""/>
               <a:tabLst>
                 <a:tab pos="755015" algn="l"/>
@@ -3014,8 +2965,6 @@
           <a:p>
             <a:fld id="{B6F15528-21DE-4FAA-801E-634DDDAF4B2B}" type="slidenum">
               <a:rPr lang="en-US" smtClean="0"/>
-              <a:pPr/>
-              <a:t>12</a:t>
             </a:fld>
             <a:endParaRPr lang="en-US"/>
           </a:p>
@@ -3091,6 +3040,7 @@
               <a:rPr spc="-5" dirty="0"/>
               <a:t>Overview</a:t>
             </a:r>
+            <a:endParaRPr spc="-5" dirty="0"/>
           </a:p>
         </p:txBody>
       </p:sp>
@@ -3122,7 +3072,7 @@
               <a:spcBef>
                 <a:spcPts val="580"/>
               </a:spcBef>
-              <a:buFont typeface="Wingdings"/>
+              <a:buFont typeface="Wingdings" panose="05000000000000000000"/>
               <a:buChar char=""/>
               <a:tabLst>
                 <a:tab pos="354965" algn="l"/>
@@ -3131,14 +3081,14 @@
             </a:pPr>
             <a:r>
               <a:rPr sz="2000" b="1" spc="-5" dirty="0">
-                <a:latin typeface="Arial"/>
-                <a:cs typeface="Arial"/>
+                <a:latin typeface="Arial" panose="020B0604020202020204"/>
+                <a:cs typeface="Arial" panose="020B0604020202020204"/>
               </a:rPr>
               <a:t>Rotate</a:t>
             </a:r>
             <a:endParaRPr sz="2000">
-              <a:latin typeface="Arial"/>
-              <a:cs typeface="Arial"/>
+              <a:latin typeface="Arial" panose="020B0604020202020204"/>
+              <a:cs typeface="Arial" panose="020B0604020202020204"/>
             </a:endParaRPr>
           </a:p>
           <a:p>
@@ -3149,7 +3099,7 @@
               <a:spcBef>
                 <a:spcPts val="480"/>
               </a:spcBef>
-              <a:buFont typeface="Wingdings"/>
+              <a:buFont typeface="Wingdings" panose="05000000000000000000"/>
               <a:buChar char=""/>
               <a:tabLst>
                 <a:tab pos="354965" algn="l"/>
@@ -3158,14 +3108,14 @@
             </a:pPr>
             <a:r>
               <a:rPr sz="2000" b="1" dirty="0">
-                <a:latin typeface="Arial"/>
-                <a:cs typeface="Arial"/>
+                <a:latin typeface="Arial" panose="020B0604020202020204"/>
+                <a:cs typeface="Arial" panose="020B0604020202020204"/>
               </a:rPr>
               <a:t>Skew</a:t>
             </a:r>
             <a:endParaRPr sz="2000">
-              <a:latin typeface="Arial"/>
-              <a:cs typeface="Arial"/>
+              <a:latin typeface="Arial" panose="020B0604020202020204"/>
+              <a:cs typeface="Arial" panose="020B0604020202020204"/>
             </a:endParaRPr>
           </a:p>
           <a:p>
@@ -3176,7 +3126,7 @@
               <a:spcBef>
                 <a:spcPts val="400"/>
               </a:spcBef>
-              <a:buFont typeface="Wingdings"/>
+              <a:buFont typeface="Wingdings" panose="05000000000000000000"/>
               <a:buChar char=""/>
               <a:tabLst>
                 <a:tab pos="354965" algn="l"/>
@@ -3185,14 +3135,14 @@
             </a:pPr>
             <a:r>
               <a:rPr sz="2000" b="1" spc="-5" dirty="0">
-                <a:latin typeface="Arial"/>
-                <a:cs typeface="Arial"/>
+                <a:latin typeface="Arial" panose="020B0604020202020204"/>
+                <a:cs typeface="Arial" panose="020B0604020202020204"/>
               </a:rPr>
               <a:t>Scale</a:t>
             </a:r>
             <a:endParaRPr sz="2000">
-              <a:latin typeface="Arial"/>
-              <a:cs typeface="Arial"/>
+              <a:latin typeface="Arial" panose="020B0604020202020204"/>
+              <a:cs typeface="Arial" panose="020B0604020202020204"/>
             </a:endParaRPr>
           </a:p>
           <a:p>
@@ -3203,7 +3153,7 @@
               <a:spcBef>
                 <a:spcPts val="500"/>
               </a:spcBef>
-              <a:buFont typeface="Wingdings"/>
+              <a:buFont typeface="Wingdings" panose="05000000000000000000"/>
               <a:buChar char=""/>
               <a:tabLst>
                 <a:tab pos="354965" algn="l"/>
@@ -3212,14 +3162,14 @@
             </a:pPr>
             <a:r>
               <a:rPr sz="2000" b="1" spc="-5" dirty="0">
-                <a:latin typeface="Arial"/>
-                <a:cs typeface="Arial"/>
+                <a:latin typeface="Arial" panose="020B0604020202020204"/>
+                <a:cs typeface="Arial" panose="020B0604020202020204"/>
               </a:rPr>
               <a:t>Translate</a:t>
             </a:r>
             <a:endParaRPr sz="2000">
-              <a:latin typeface="Arial"/>
-              <a:cs typeface="Arial"/>
+              <a:latin typeface="Arial" panose="020B0604020202020204"/>
+              <a:cs typeface="Arial" panose="020B0604020202020204"/>
             </a:endParaRPr>
           </a:p>
           <a:p>
@@ -3230,7 +3180,7 @@
               <a:spcBef>
                 <a:spcPts val="500"/>
               </a:spcBef>
-              <a:buFont typeface="Wingdings"/>
+              <a:buFont typeface="Wingdings" panose="05000000000000000000"/>
               <a:buChar char=""/>
               <a:tabLst>
                 <a:tab pos="354965" algn="l"/>
@@ -3239,14 +3189,14 @@
             </a:pPr>
             <a:r>
               <a:rPr sz="2000" b="1" spc="-5" dirty="0">
-                <a:latin typeface="Arial"/>
-                <a:cs typeface="Arial"/>
+                <a:latin typeface="Arial" panose="020B0604020202020204"/>
+                <a:cs typeface="Arial" panose="020B0604020202020204"/>
               </a:rPr>
               <a:t>Summary</a:t>
             </a:r>
             <a:endParaRPr sz="2000">
-              <a:latin typeface="Arial"/>
-              <a:cs typeface="Arial"/>
+              <a:latin typeface="Arial" panose="020B0604020202020204"/>
+              <a:cs typeface="Arial" panose="020B0604020202020204"/>
             </a:endParaRPr>
           </a:p>
         </p:txBody>
@@ -3268,8 +3218,6 @@
           <a:p>
             <a:fld id="{B6F15528-21DE-4FAA-801E-634DDDAF4B2B}" type="slidenum">
               <a:rPr lang="en-US" smtClean="0"/>
-              <a:pPr/>
-              <a:t>2</a:t>
             </a:fld>
             <a:endParaRPr lang="en-US"/>
           </a:p>
@@ -3408,28 +3356,28 @@
             </a:pPr>
             <a:r>
               <a:rPr sz="2800" b="1" dirty="0">
-                <a:latin typeface="Arial"/>
-                <a:cs typeface="Arial"/>
+                <a:latin typeface="Arial" panose="020B0604020202020204"/>
+                <a:cs typeface="Arial" panose="020B0604020202020204"/>
               </a:rPr>
               <a:t>R</a:t>
             </a:r>
             <a:r>
               <a:rPr sz="2800" b="1" spc="-5" dirty="0">
-                <a:latin typeface="Arial"/>
-                <a:cs typeface="Arial"/>
+                <a:latin typeface="Arial" panose="020B0604020202020204"/>
+                <a:cs typeface="Arial" panose="020B0604020202020204"/>
               </a:rPr>
               <a:t>o</a:t>
             </a:r>
             <a:r>
               <a:rPr sz="2800" b="1" dirty="0">
-                <a:latin typeface="Arial"/>
-                <a:cs typeface="Arial"/>
+                <a:latin typeface="Arial" panose="020B0604020202020204"/>
+                <a:cs typeface="Arial" panose="020B0604020202020204"/>
               </a:rPr>
               <a:t>tate</a:t>
             </a:r>
             <a:endParaRPr sz="2800">
-              <a:latin typeface="Arial"/>
-              <a:cs typeface="Arial"/>
+              <a:latin typeface="Arial" panose="020B0604020202020204"/>
+              <a:cs typeface="Arial" panose="020B0604020202020204"/>
             </a:endParaRPr>
           </a:p>
         </p:txBody>
@@ -3451,8 +3399,6 @@
           <a:p>
             <a:fld id="{B6F15528-21DE-4FAA-801E-634DDDAF4B2B}" type="slidenum">
               <a:rPr lang="en-US" smtClean="0"/>
-              <a:pPr/>
-              <a:t>3</a:t>
             </a:fld>
             <a:endParaRPr lang="en-US"/>
           </a:p>
@@ -3528,6 +3474,7 @@
               <a:rPr dirty="0"/>
               <a:t>tate</a:t>
             </a:r>
+            <a:endParaRPr dirty="0"/>
           </a:p>
         </p:txBody>
       </p:sp>
@@ -3590,9 +3537,7 @@
           <p:txBody>
             <a:bodyPr wrap="square" lIns="0" tIns="0" rIns="0" bIns="0" rtlCol="0"/>
             <a:lstStyle/>
-            <a:p>
-              <a:endParaRPr/>
-            </a:p>
+            <a:p/>
           </p:txBody>
         </p:sp>
         <p:sp>
@@ -3642,9 +3587,7 @@
           <p:txBody>
             <a:bodyPr wrap="square" lIns="0" tIns="0" rIns="0" bIns="0" rtlCol="0"/>
             <a:lstStyle/>
-            <a:p>
-              <a:endParaRPr/>
-            </a:p>
+            <a:p/>
           </p:txBody>
         </p:sp>
       </p:grpSp>
@@ -3679,14 +3622,14 @@
             </a:pPr>
             <a:r>
               <a:rPr sz="1800" dirty="0">
-                <a:latin typeface="Consolas"/>
-                <a:cs typeface="Consolas"/>
+                <a:latin typeface="Consolas" panose="020B0609020204030204"/>
+                <a:cs typeface="Consolas" panose="020B0609020204030204"/>
               </a:rPr>
               <a:t>rotate(15deg);</a:t>
             </a:r>
             <a:endParaRPr sz="1800">
-              <a:latin typeface="Consolas"/>
-              <a:cs typeface="Consolas"/>
+              <a:latin typeface="Consolas" panose="020B0609020204030204"/>
+              <a:cs typeface="Consolas" panose="020B0609020204030204"/>
             </a:endParaRPr>
           </a:p>
         </p:txBody>
@@ -3699,7 +3642,7 @@
         </p:nvSpPr>
         <p:spPr>
           <a:xfrm>
-            <a:off x="3554582" y="2945383"/>
+            <a:off x="3554582" y="3260343"/>
             <a:ext cx="1898650" cy="299720"/>
           </a:xfrm>
           <a:prstGeom prst="rect">
@@ -3722,14 +3665,14 @@
             </a:pPr>
             <a:r>
               <a:rPr sz="1800" dirty="0">
-                <a:latin typeface="Consolas"/>
-                <a:cs typeface="Consolas"/>
+                <a:latin typeface="Consolas" panose="020B0609020204030204"/>
+                <a:cs typeface="Consolas" panose="020B0609020204030204"/>
               </a:rPr>
               <a:t>rotate(180deg);</a:t>
             </a:r>
             <a:endParaRPr sz="1800">
-              <a:latin typeface="Consolas"/>
-              <a:cs typeface="Consolas"/>
+              <a:latin typeface="Consolas" panose="020B0609020204030204"/>
+              <a:cs typeface="Consolas" panose="020B0609020204030204"/>
             </a:endParaRPr>
           </a:p>
         </p:txBody>
@@ -3765,28 +3708,28 @@
             </a:pPr>
             <a:r>
               <a:rPr sz="1800" dirty="0">
-                <a:latin typeface="Consolas"/>
-                <a:cs typeface="Consolas"/>
+                <a:latin typeface="Consolas" panose="020B0609020204030204"/>
+                <a:cs typeface="Consolas" panose="020B0609020204030204"/>
               </a:rPr>
               <a:t>.tilt</a:t>
             </a:r>
             <a:r>
               <a:rPr sz="1800" spc="-65" dirty="0">
-                <a:latin typeface="Consolas"/>
-                <a:cs typeface="Consolas"/>
+                <a:latin typeface="Consolas" panose="020B0609020204030204"/>
+                <a:cs typeface="Consolas" panose="020B0609020204030204"/>
               </a:rPr>
               <a:t> </a:t>
             </a:r>
             <a:r>
               <a:rPr sz="1800" dirty="0">
-                <a:latin typeface="Consolas"/>
-                <a:cs typeface="Consolas"/>
+                <a:latin typeface="Consolas" panose="020B0609020204030204"/>
+                <a:cs typeface="Consolas" panose="020B0609020204030204"/>
               </a:rPr>
               <a:t>{</a:t>
             </a:r>
             <a:endParaRPr sz="1800">
-              <a:latin typeface="Consolas"/>
-              <a:cs typeface="Consolas"/>
+              <a:latin typeface="Consolas" panose="020B0609020204030204"/>
+              <a:cs typeface="Consolas" panose="020B0609020204030204"/>
             </a:endParaRPr>
           </a:p>
           <a:p>
@@ -3800,14 +3743,14 @@
             </a:pPr>
             <a:r>
               <a:rPr sz="1800" dirty="0">
-                <a:latin typeface="Consolas"/>
-                <a:cs typeface="Consolas"/>
+                <a:latin typeface="Consolas" panose="020B0609020204030204"/>
+                <a:cs typeface="Consolas" panose="020B0609020204030204"/>
               </a:rPr>
               <a:t>transform:</a:t>
             </a:r>
             <a:endParaRPr sz="1800">
-              <a:latin typeface="Consolas"/>
-              <a:cs typeface="Consolas"/>
+              <a:latin typeface="Consolas" panose="020B0609020204030204"/>
+              <a:cs typeface="Consolas" panose="020B0609020204030204"/>
             </a:endParaRPr>
           </a:p>
           <a:p>
@@ -3821,60 +3764,60 @@
             </a:pPr>
             <a:r>
               <a:rPr sz="1800" dirty="0">
-                <a:latin typeface="Consolas"/>
-                <a:cs typeface="Consolas"/>
+                <a:latin typeface="Consolas" panose="020B0609020204030204"/>
+                <a:cs typeface="Consolas" panose="020B0609020204030204"/>
               </a:rPr>
               <a:t>}</a:t>
             </a:r>
             <a:endParaRPr sz="1800">
-              <a:latin typeface="Consolas"/>
-              <a:cs typeface="Consolas"/>
+              <a:latin typeface="Consolas" panose="020B0609020204030204"/>
+              <a:cs typeface="Consolas" panose="020B0609020204030204"/>
             </a:endParaRPr>
           </a:p>
           <a:p>
             <a:pPr marL="342265" marR="5080" indent="-342900">
               <a:lnSpc>
-                <a:spcPct val="120400"/>
+                <a:spcPct val="120000"/>
               </a:lnSpc>
             </a:pPr>
             <a:r>
               <a:rPr sz="1800" dirty="0">
-                <a:latin typeface="Consolas"/>
-                <a:cs typeface="Consolas"/>
+                <a:latin typeface="Consolas" panose="020B0609020204030204"/>
+                <a:cs typeface="Consolas" panose="020B0609020204030204"/>
               </a:rPr>
               <a:t>.upsideDown</a:t>
             </a:r>
             <a:r>
               <a:rPr sz="1800" spc="-100" dirty="0">
-                <a:latin typeface="Consolas"/>
-                <a:cs typeface="Consolas"/>
+                <a:latin typeface="Consolas" panose="020B0609020204030204"/>
+                <a:cs typeface="Consolas" panose="020B0609020204030204"/>
               </a:rPr>
               <a:t> </a:t>
             </a:r>
             <a:r>
               <a:rPr sz="1800" dirty="0">
-                <a:latin typeface="Consolas"/>
-                <a:cs typeface="Consolas"/>
+                <a:latin typeface="Consolas" panose="020B0609020204030204"/>
+                <a:cs typeface="Consolas" panose="020B0609020204030204"/>
               </a:rPr>
               <a:t>{ </a:t>
             </a:r>
             <a:r>
               <a:rPr sz="1800" spc="-975" dirty="0">
-                <a:latin typeface="Consolas"/>
-                <a:cs typeface="Consolas"/>
+                <a:latin typeface="Consolas" panose="020B0609020204030204"/>
+                <a:cs typeface="Consolas" panose="020B0609020204030204"/>
               </a:rPr>
               <a:t> </a:t>
             </a:r>
             <a:r>
               <a:rPr sz="1800" dirty="0">
-                <a:latin typeface="Consolas"/>
-                <a:cs typeface="Consolas"/>
+                <a:latin typeface="Consolas" panose="020B0609020204030204"/>
+                <a:cs typeface="Consolas" panose="020B0609020204030204"/>
               </a:rPr>
               <a:t>transform:</a:t>
             </a:r>
             <a:endParaRPr sz="1800">
-              <a:latin typeface="Consolas"/>
-              <a:cs typeface="Consolas"/>
+              <a:latin typeface="Consolas" panose="020B0609020204030204"/>
+              <a:cs typeface="Consolas" panose="020B0609020204030204"/>
             </a:endParaRPr>
           </a:p>
           <a:p>
@@ -3888,14 +3831,14 @@
             </a:pPr>
             <a:r>
               <a:rPr sz="1800" dirty="0">
-                <a:latin typeface="Consolas"/>
-                <a:cs typeface="Consolas"/>
+                <a:latin typeface="Consolas" panose="020B0609020204030204"/>
+                <a:cs typeface="Consolas" panose="020B0609020204030204"/>
               </a:rPr>
               <a:t>}</a:t>
             </a:r>
             <a:endParaRPr sz="1800">
-              <a:latin typeface="Consolas"/>
-              <a:cs typeface="Consolas"/>
+              <a:latin typeface="Consolas" panose="020B0609020204030204"/>
+              <a:cs typeface="Consolas" panose="020B0609020204030204"/>
             </a:endParaRPr>
           </a:p>
         </p:txBody>
@@ -3917,8 +3860,6 @@
           <a:p>
             <a:fld id="{B6F15528-21DE-4FAA-801E-634DDDAF4B2B}" type="slidenum">
               <a:rPr lang="en-US" smtClean="0"/>
-              <a:pPr/>
-              <a:t>4</a:t>
             </a:fld>
             <a:endParaRPr lang="en-US"/>
           </a:p>
@@ -4049,14 +3990,14 @@
             </a:pPr>
             <a:r>
               <a:rPr sz="2800" b="1" dirty="0">
-                <a:latin typeface="Arial"/>
-                <a:cs typeface="Arial"/>
+                <a:latin typeface="Arial" panose="020B0604020202020204"/>
+                <a:cs typeface="Arial" panose="020B0604020202020204"/>
               </a:rPr>
               <a:t>Skew</a:t>
             </a:r>
             <a:endParaRPr sz="2800">
-              <a:latin typeface="Arial"/>
-              <a:cs typeface="Arial"/>
+              <a:latin typeface="Arial" panose="020B0604020202020204"/>
+              <a:cs typeface="Arial" panose="020B0604020202020204"/>
             </a:endParaRPr>
           </a:p>
         </p:txBody>
@@ -4078,8 +4019,6 @@
           <a:p>
             <a:fld id="{B6F15528-21DE-4FAA-801E-634DDDAF4B2B}" type="slidenum">
               <a:rPr lang="en-US" smtClean="0"/>
-              <a:pPr/>
-              <a:t>5</a:t>
             </a:fld>
             <a:endParaRPr lang="en-US"/>
           </a:p>
@@ -4147,6 +4086,7 @@
               <a:rPr dirty="0"/>
               <a:t>Skew</a:t>
             </a:r>
+            <a:endParaRPr dirty="0"/>
           </a:p>
         </p:txBody>
       </p:sp>
@@ -4209,9 +4149,7 @@
           <p:txBody>
             <a:bodyPr wrap="square" lIns="0" tIns="0" rIns="0" bIns="0" rtlCol="0"/>
             <a:lstStyle/>
-            <a:p>
-              <a:endParaRPr/>
-            </a:p>
+            <a:p/>
           </p:txBody>
         </p:sp>
         <p:sp>
@@ -4261,9 +4199,7 @@
           <p:txBody>
             <a:bodyPr wrap="square" lIns="0" tIns="0" rIns="0" bIns="0" rtlCol="0"/>
             <a:lstStyle/>
-            <a:p>
-              <a:endParaRPr/>
-            </a:p>
+            <a:p/>
           </p:txBody>
         </p:sp>
       </p:grpSp>
@@ -4275,7 +4211,7 @@
         </p:nvSpPr>
         <p:spPr>
           <a:xfrm>
-            <a:off x="3554582" y="1954783"/>
+            <a:off x="3554582" y="2259583"/>
             <a:ext cx="2401570" cy="299720"/>
           </a:xfrm>
           <a:prstGeom prst="rect">
@@ -4298,28 +4234,28 @@
             </a:pPr>
             <a:r>
               <a:rPr sz="1800" dirty="0">
-                <a:latin typeface="Consolas"/>
-                <a:cs typeface="Consolas"/>
+                <a:latin typeface="Consolas" panose="020B0609020204030204"/>
+                <a:cs typeface="Consolas" panose="020B0609020204030204"/>
               </a:rPr>
               <a:t>skew(30deg,</a:t>
             </a:r>
             <a:r>
               <a:rPr sz="1800" spc="-95" dirty="0">
-                <a:latin typeface="Consolas"/>
-                <a:cs typeface="Consolas"/>
+                <a:latin typeface="Consolas" panose="020B0609020204030204"/>
+                <a:cs typeface="Consolas" panose="020B0609020204030204"/>
               </a:rPr>
               <a:t> </a:t>
             </a:r>
             <a:r>
               <a:rPr sz="1800" dirty="0">
-                <a:latin typeface="Consolas"/>
-                <a:cs typeface="Consolas"/>
+                <a:latin typeface="Consolas" panose="020B0609020204030204"/>
+                <a:cs typeface="Consolas" panose="020B0609020204030204"/>
               </a:rPr>
               <a:t>30deg);</a:t>
             </a:r>
             <a:endParaRPr sz="1800">
-              <a:latin typeface="Consolas"/>
-              <a:cs typeface="Consolas"/>
+              <a:latin typeface="Consolas" panose="020B0609020204030204"/>
+              <a:cs typeface="Consolas" panose="020B0609020204030204"/>
             </a:endParaRPr>
           </a:p>
         </p:txBody>
@@ -4332,7 +4268,7 @@
         </p:nvSpPr>
         <p:spPr>
           <a:xfrm>
-            <a:off x="3554149" y="2945383"/>
+            <a:off x="3554149" y="3250183"/>
             <a:ext cx="1647189" cy="299720"/>
           </a:xfrm>
           <a:prstGeom prst="rect">
@@ -4355,14 +4291,14 @@
             </a:pPr>
             <a:r>
               <a:rPr sz="1800" dirty="0">
-                <a:latin typeface="Consolas"/>
-                <a:cs typeface="Consolas"/>
+                <a:latin typeface="Consolas" panose="020B0609020204030204"/>
+                <a:cs typeface="Consolas" panose="020B0609020204030204"/>
               </a:rPr>
               <a:t>skewX(30deg);</a:t>
             </a:r>
             <a:endParaRPr sz="1800">
-              <a:latin typeface="Consolas"/>
-              <a:cs typeface="Consolas"/>
+              <a:latin typeface="Consolas" panose="020B0609020204030204"/>
+              <a:cs typeface="Consolas" panose="020B0609020204030204"/>
             </a:endParaRPr>
           </a:p>
         </p:txBody>
@@ -4390,7 +4326,7 @@
           <a:p>
             <a:pPr marL="342265" marR="289560" indent="-342900">
               <a:lnSpc>
-                <a:spcPct val="117200"/>
+                <a:spcPct val="117000"/>
               </a:lnSpc>
               <a:spcBef>
                 <a:spcPts val="100"/>
@@ -4398,28 +4334,28 @@
             </a:pPr>
             <a:r>
               <a:rPr sz="1800" dirty="0">
-                <a:latin typeface="Consolas"/>
-                <a:cs typeface="Consolas"/>
+                <a:latin typeface="Consolas" panose="020B0609020204030204"/>
+                <a:cs typeface="Consolas" panose="020B0609020204030204"/>
               </a:rPr>
               <a:t>.twisted { </a:t>
             </a:r>
             <a:r>
               <a:rPr sz="1800" spc="5" dirty="0">
-                <a:latin typeface="Consolas"/>
-                <a:cs typeface="Consolas"/>
+                <a:latin typeface="Consolas" panose="020B0609020204030204"/>
+                <a:cs typeface="Consolas" panose="020B0609020204030204"/>
               </a:rPr>
               <a:t> </a:t>
             </a:r>
             <a:r>
               <a:rPr sz="1800" dirty="0">
-                <a:latin typeface="Consolas"/>
-                <a:cs typeface="Consolas"/>
+                <a:latin typeface="Consolas" panose="020B0609020204030204"/>
+                <a:cs typeface="Consolas" panose="020B0609020204030204"/>
               </a:rPr>
               <a:t>transform:</a:t>
             </a:r>
             <a:endParaRPr sz="1800">
-              <a:latin typeface="Consolas"/>
-              <a:cs typeface="Consolas"/>
+              <a:latin typeface="Consolas" panose="020B0609020204030204"/>
+              <a:cs typeface="Consolas" panose="020B0609020204030204"/>
             </a:endParaRPr>
           </a:p>
           <a:p>
@@ -4433,60 +4369,60 @@
             </a:pPr>
             <a:r>
               <a:rPr sz="1800" dirty="0">
-                <a:latin typeface="Consolas"/>
-                <a:cs typeface="Consolas"/>
+                <a:latin typeface="Consolas" panose="020B0609020204030204"/>
+                <a:cs typeface="Consolas" panose="020B0609020204030204"/>
               </a:rPr>
               <a:t>}</a:t>
             </a:r>
             <a:endParaRPr sz="1800">
-              <a:latin typeface="Consolas"/>
-              <a:cs typeface="Consolas"/>
+              <a:latin typeface="Consolas" panose="020B0609020204030204"/>
+              <a:cs typeface="Consolas" panose="020B0609020204030204"/>
             </a:endParaRPr>
           </a:p>
           <a:p>
             <a:pPr marL="342265" marR="5080" indent="-342900">
               <a:lnSpc>
-                <a:spcPct val="120400"/>
+                <a:spcPct val="120000"/>
               </a:lnSpc>
             </a:pPr>
             <a:r>
               <a:rPr sz="1800" dirty="0">
-                <a:latin typeface="Consolas"/>
-                <a:cs typeface="Consolas"/>
+                <a:latin typeface="Consolas" panose="020B0609020204030204"/>
+                <a:cs typeface="Consolas" panose="020B0609020204030204"/>
               </a:rPr>
               <a:t>.leanBackLeft</a:t>
             </a:r>
             <a:r>
               <a:rPr sz="1800" spc="-100" dirty="0">
-                <a:latin typeface="Consolas"/>
-                <a:cs typeface="Consolas"/>
+                <a:latin typeface="Consolas" panose="020B0609020204030204"/>
+                <a:cs typeface="Consolas" panose="020B0609020204030204"/>
               </a:rPr>
               <a:t> </a:t>
             </a:r>
             <a:r>
               <a:rPr sz="1800" dirty="0">
-                <a:latin typeface="Consolas"/>
-                <a:cs typeface="Consolas"/>
+                <a:latin typeface="Consolas" panose="020B0609020204030204"/>
+                <a:cs typeface="Consolas" panose="020B0609020204030204"/>
               </a:rPr>
               <a:t>{ </a:t>
             </a:r>
             <a:r>
               <a:rPr sz="1800" spc="-980" dirty="0">
-                <a:latin typeface="Consolas"/>
-                <a:cs typeface="Consolas"/>
+                <a:latin typeface="Consolas" panose="020B0609020204030204"/>
+                <a:cs typeface="Consolas" panose="020B0609020204030204"/>
               </a:rPr>
               <a:t> </a:t>
             </a:r>
             <a:r>
               <a:rPr sz="1800" dirty="0">
-                <a:latin typeface="Consolas"/>
-                <a:cs typeface="Consolas"/>
+                <a:latin typeface="Consolas" panose="020B0609020204030204"/>
+                <a:cs typeface="Consolas" panose="020B0609020204030204"/>
               </a:rPr>
               <a:t>transform:</a:t>
             </a:r>
             <a:endParaRPr sz="1800">
-              <a:latin typeface="Consolas"/>
-              <a:cs typeface="Consolas"/>
+              <a:latin typeface="Consolas" panose="020B0609020204030204"/>
+              <a:cs typeface="Consolas" panose="020B0609020204030204"/>
             </a:endParaRPr>
           </a:p>
           <a:p>
@@ -4495,19 +4431,19 @@
                 <a:spcPct val="100000"/>
               </a:lnSpc>
               <a:spcBef>
-                <a:spcPts val="439"/>
+                <a:spcPts val="440"/>
               </a:spcBef>
             </a:pPr>
             <a:r>
               <a:rPr sz="1800" dirty="0">
-                <a:latin typeface="Consolas"/>
-                <a:cs typeface="Consolas"/>
+                <a:latin typeface="Consolas" panose="020B0609020204030204"/>
+                <a:cs typeface="Consolas" panose="020B0609020204030204"/>
               </a:rPr>
               <a:t>}</a:t>
             </a:r>
             <a:endParaRPr sz="1800">
-              <a:latin typeface="Consolas"/>
-              <a:cs typeface="Consolas"/>
+              <a:latin typeface="Consolas" panose="020B0609020204030204"/>
+              <a:cs typeface="Consolas" panose="020B0609020204030204"/>
             </a:endParaRPr>
           </a:p>
         </p:txBody>
@@ -4520,7 +4456,7 @@
         </p:nvSpPr>
         <p:spPr>
           <a:xfrm>
-            <a:off x="1577339" y="3549903"/>
+            <a:off x="1577339" y="3854703"/>
             <a:ext cx="3749675" cy="1016000"/>
           </a:xfrm>
           <a:prstGeom prst="rect">
@@ -4543,28 +4479,28 @@
             </a:pPr>
             <a:r>
               <a:rPr sz="1800" dirty="0">
-                <a:latin typeface="Consolas"/>
-                <a:cs typeface="Consolas"/>
+                <a:latin typeface="Consolas" panose="020B0609020204030204"/>
+                <a:cs typeface="Consolas" panose="020B0609020204030204"/>
               </a:rPr>
               <a:t>.stretchUpRight</a:t>
             </a:r>
             <a:r>
               <a:rPr sz="1800" spc="-65" dirty="0">
-                <a:latin typeface="Consolas"/>
-                <a:cs typeface="Consolas"/>
+                <a:latin typeface="Consolas" panose="020B0609020204030204"/>
+                <a:cs typeface="Consolas" panose="020B0609020204030204"/>
               </a:rPr>
               <a:t> </a:t>
             </a:r>
             <a:r>
               <a:rPr sz="1800" dirty="0">
-                <a:latin typeface="Consolas"/>
-                <a:cs typeface="Consolas"/>
+                <a:latin typeface="Consolas" panose="020B0609020204030204"/>
+                <a:cs typeface="Consolas" panose="020B0609020204030204"/>
               </a:rPr>
               <a:t>{</a:t>
             </a:r>
             <a:endParaRPr sz="1800">
-              <a:latin typeface="Consolas"/>
-              <a:cs typeface="Consolas"/>
+              <a:latin typeface="Consolas" panose="020B0609020204030204"/>
+              <a:cs typeface="Consolas" panose="020B0609020204030204"/>
             </a:endParaRPr>
           </a:p>
           <a:p>
@@ -4573,7 +4509,7 @@
                 <a:spcPct val="100000"/>
               </a:lnSpc>
               <a:spcBef>
-                <a:spcPts val="439"/>
+                <a:spcPts val="440"/>
               </a:spcBef>
               <a:tabLst>
                 <a:tab pos="1976120" algn="l"/>
@@ -4581,14 +4517,14 @@
             </a:pPr>
             <a:r>
               <a:rPr sz="1800" dirty="0">
-                <a:latin typeface="Consolas"/>
-                <a:cs typeface="Consolas"/>
+                <a:latin typeface="Consolas" panose="020B0609020204030204"/>
+                <a:cs typeface="Consolas" panose="020B0609020204030204"/>
               </a:rPr>
               <a:t>transform:	skewY(150deg);</a:t>
             </a:r>
             <a:endParaRPr sz="1800">
-              <a:latin typeface="Consolas"/>
-              <a:cs typeface="Consolas"/>
+              <a:latin typeface="Consolas" panose="020B0609020204030204"/>
+              <a:cs typeface="Consolas" panose="020B0609020204030204"/>
             </a:endParaRPr>
           </a:p>
           <a:p>
@@ -4597,19 +4533,19 @@
                 <a:spcPct val="100000"/>
               </a:lnSpc>
               <a:spcBef>
-                <a:spcPts val="439"/>
+                <a:spcPts val="440"/>
               </a:spcBef>
             </a:pPr>
             <a:r>
               <a:rPr sz="1800" dirty="0">
-                <a:latin typeface="Consolas"/>
-                <a:cs typeface="Consolas"/>
+                <a:latin typeface="Consolas" panose="020B0609020204030204"/>
+                <a:cs typeface="Consolas" panose="020B0609020204030204"/>
               </a:rPr>
               <a:t>}</a:t>
             </a:r>
             <a:endParaRPr sz="1800">
-              <a:latin typeface="Consolas"/>
-              <a:cs typeface="Consolas"/>
+              <a:latin typeface="Consolas" panose="020B0609020204030204"/>
+              <a:cs typeface="Consolas" panose="020B0609020204030204"/>
             </a:endParaRPr>
           </a:p>
         </p:txBody>
@@ -4631,8 +4567,6 @@
           <a:p>
             <a:fld id="{B6F15528-21DE-4FAA-801E-634DDDAF4B2B}" type="slidenum">
               <a:rPr lang="en-US" smtClean="0"/>
-              <a:pPr/>
-              <a:t>6</a:t>
             </a:fld>
             <a:endParaRPr lang="en-US"/>
           </a:p>
@@ -4739,28 +4673,28 @@
             </a:pPr>
             <a:r>
               <a:rPr sz="2800" b="1" dirty="0">
-                <a:latin typeface="Arial"/>
-                <a:cs typeface="Arial"/>
+                <a:latin typeface="Arial" panose="020B0604020202020204"/>
+                <a:cs typeface="Arial" panose="020B0604020202020204"/>
               </a:rPr>
               <a:t>Sca</a:t>
             </a:r>
             <a:r>
               <a:rPr sz="2800" b="1" spc="-5" dirty="0">
-                <a:latin typeface="Arial"/>
-                <a:cs typeface="Arial"/>
+                <a:latin typeface="Arial" panose="020B0604020202020204"/>
+                <a:cs typeface="Arial" panose="020B0604020202020204"/>
               </a:rPr>
               <a:t>l</a:t>
             </a:r>
             <a:r>
               <a:rPr sz="2800" b="1" dirty="0">
-                <a:latin typeface="Arial"/>
-                <a:cs typeface="Arial"/>
+                <a:latin typeface="Arial" panose="020B0604020202020204"/>
+                <a:cs typeface="Arial" panose="020B0604020202020204"/>
               </a:rPr>
               <a:t>e</a:t>
             </a:r>
             <a:endParaRPr sz="2800">
-              <a:latin typeface="Arial"/>
-              <a:cs typeface="Arial"/>
+              <a:latin typeface="Arial" panose="020B0604020202020204"/>
+              <a:cs typeface="Arial" panose="020B0604020202020204"/>
             </a:endParaRPr>
           </a:p>
         </p:txBody>
@@ -4782,8 +4716,6 @@
           <a:p>
             <a:fld id="{B6F15528-21DE-4FAA-801E-634DDDAF4B2B}" type="slidenum">
               <a:rPr lang="en-US" smtClean="0"/>
-              <a:pPr/>
-              <a:t>7</a:t>
             </a:fld>
             <a:endParaRPr lang="en-US"/>
           </a:p>
@@ -4859,6 +4791,7 @@
               <a:rPr dirty="0"/>
               <a:t>e</a:t>
             </a:r>
+            <a:endParaRPr dirty="0"/>
           </a:p>
         </p:txBody>
       </p:sp>
@@ -4870,8 +4803,8 @@
         </p:nvGrpSpPr>
         <p:grpSpPr>
           <a:xfrm>
-            <a:off x="1481137" y="1595437"/>
-            <a:ext cx="6181725" cy="3971925"/>
+            <a:off x="1480820" y="1595120"/>
+            <a:ext cx="6554470" cy="4796155"/>
             <a:chOff x="1481137" y="1595437"/>
             <a:chExt cx="6181725" cy="3971925"/>
           </a:xfrm>
@@ -4921,9 +4854,7 @@
           <p:txBody>
             <a:bodyPr wrap="square" lIns="0" tIns="0" rIns="0" bIns="0" rtlCol="0"/>
             <a:lstStyle/>
-            <a:p>
-              <a:endParaRPr/>
-            </a:p>
+            <a:p/>
           </p:txBody>
         </p:sp>
         <p:sp>
@@ -4973,9 +4904,7 @@
           <p:txBody>
             <a:bodyPr wrap="square" lIns="0" tIns="0" rIns="0" bIns="0" rtlCol="0"/>
             <a:lstStyle/>
-            <a:p>
-              <a:endParaRPr/>
-            </a:p>
+            <a:p/>
           </p:txBody>
         </p:sp>
       </p:grpSp>
@@ -5010,14 +4939,14 @@
             </a:pPr>
             <a:r>
               <a:rPr sz="1800" dirty="0">
-                <a:latin typeface="Consolas"/>
-                <a:cs typeface="Consolas"/>
+                <a:latin typeface="Consolas" panose="020B0609020204030204"/>
+                <a:cs typeface="Consolas" panose="020B0609020204030204"/>
               </a:rPr>
               <a:t>scale(0.5);</a:t>
             </a:r>
             <a:endParaRPr sz="1800">
-              <a:latin typeface="Consolas"/>
-              <a:cs typeface="Consolas"/>
+              <a:latin typeface="Consolas" panose="020B0609020204030204"/>
+              <a:cs typeface="Consolas" panose="020B0609020204030204"/>
             </a:endParaRPr>
           </a:p>
         </p:txBody>
@@ -5030,8 +4959,8 @@
         </p:nvSpPr>
         <p:spPr>
           <a:xfrm>
-            <a:off x="3554149" y="2945383"/>
-            <a:ext cx="1647189" cy="1290320"/>
+            <a:off x="3554095" y="3249930"/>
+            <a:ext cx="1826895" cy="2222500"/>
           </a:xfrm>
           <a:prstGeom prst="rect">
             <a:avLst/>
@@ -5053,14 +4982,14 @@
             </a:pPr>
             <a:r>
               <a:rPr sz="1800" dirty="0">
-                <a:latin typeface="Consolas"/>
-                <a:cs typeface="Consolas"/>
+                <a:latin typeface="Consolas" panose="020B0609020204030204"/>
+                <a:cs typeface="Consolas" panose="020B0609020204030204"/>
               </a:rPr>
               <a:t>scale(2);</a:t>
             </a:r>
             <a:endParaRPr sz="1800">
-              <a:latin typeface="Consolas"/>
-              <a:cs typeface="Consolas"/>
+              <a:latin typeface="Consolas" panose="020B0609020204030204"/>
+              <a:cs typeface="Consolas" panose="020B0609020204030204"/>
             </a:endParaRPr>
           </a:p>
           <a:p>
@@ -5070,8 +4999,8 @@
               </a:lnSpc>
             </a:pPr>
             <a:endParaRPr sz="1800">
-              <a:latin typeface="Consolas"/>
-              <a:cs typeface="Consolas"/>
+              <a:latin typeface="Consolas" panose="020B0609020204030204"/>
+              <a:cs typeface="Consolas" panose="020B0609020204030204"/>
             </a:endParaRPr>
           </a:p>
           <a:p>
@@ -5081,8 +5010,8 @@
               </a:lnSpc>
             </a:pPr>
             <a:endParaRPr sz="1800">
-              <a:latin typeface="Consolas"/>
-              <a:cs typeface="Consolas"/>
+              <a:latin typeface="Consolas" panose="020B0609020204030204"/>
+              <a:cs typeface="Consolas" panose="020B0609020204030204"/>
             </a:endParaRPr>
           </a:p>
           <a:p>
@@ -5094,16 +5023,44 @@
                 <a:spcPts val="1425"/>
               </a:spcBef>
             </a:pPr>
+            <a:endParaRPr sz="1800" dirty="0">
+              <a:latin typeface="Consolas" panose="020B0609020204030204"/>
+              <a:cs typeface="Consolas" panose="020B0609020204030204"/>
+            </a:endParaRPr>
+          </a:p>
+          <a:p>
+            <a:pPr>
+              <a:lnSpc>
+                <a:spcPct val="100000"/>
+              </a:lnSpc>
+              <a:spcBef>
+                <a:spcPts val="1425"/>
+              </a:spcBef>
+            </a:pPr>
+            <a:endParaRPr sz="1800" dirty="0">
+              <a:latin typeface="Consolas" panose="020B0609020204030204"/>
+              <a:cs typeface="Consolas" panose="020B0609020204030204"/>
+            </a:endParaRPr>
+          </a:p>
+          <a:p>
+            <a:pPr>
+              <a:lnSpc>
+                <a:spcPct val="100000"/>
+              </a:lnSpc>
+              <a:spcBef>
+                <a:spcPts val="1425"/>
+              </a:spcBef>
+            </a:pPr>
             <a:r>
               <a:rPr sz="1800" dirty="0">
-                <a:latin typeface="Consolas"/>
-                <a:cs typeface="Consolas"/>
+                <a:latin typeface="Consolas" panose="020B0609020204030204"/>
+                <a:cs typeface="Consolas" panose="020B0609020204030204"/>
               </a:rPr>
               <a:t>scaleX(0.75);</a:t>
             </a:r>
             <a:endParaRPr sz="1800">
-              <a:latin typeface="Consolas"/>
-              <a:cs typeface="Consolas"/>
+              <a:latin typeface="Consolas" panose="020B0609020204030204"/>
+              <a:cs typeface="Consolas" panose="020B0609020204030204"/>
             </a:endParaRPr>
           </a:p>
         </p:txBody>
@@ -5117,7 +5074,7 @@
         <p:spPr>
           <a:xfrm>
             <a:off x="1577339" y="1585976"/>
-            <a:ext cx="1772920" cy="2980055"/>
+            <a:ext cx="1772920" cy="3986530"/>
           </a:xfrm>
           <a:prstGeom prst="rect">
             <a:avLst/>
@@ -5139,28 +5096,28 @@
             </a:pPr>
             <a:r>
               <a:rPr sz="1800" dirty="0">
-                <a:latin typeface="Consolas"/>
-                <a:cs typeface="Consolas"/>
+                <a:latin typeface="Consolas" panose="020B0609020204030204"/>
+                <a:cs typeface="Consolas" panose="020B0609020204030204"/>
               </a:rPr>
               <a:t>.miniMe</a:t>
             </a:r>
             <a:r>
               <a:rPr sz="1800" spc="-65" dirty="0">
-                <a:latin typeface="Consolas"/>
-                <a:cs typeface="Consolas"/>
+                <a:latin typeface="Consolas" panose="020B0609020204030204"/>
+                <a:cs typeface="Consolas" panose="020B0609020204030204"/>
               </a:rPr>
               <a:t> </a:t>
             </a:r>
             <a:r>
               <a:rPr sz="1800" dirty="0">
-                <a:latin typeface="Consolas"/>
-                <a:cs typeface="Consolas"/>
+                <a:latin typeface="Consolas" panose="020B0609020204030204"/>
+                <a:cs typeface="Consolas" panose="020B0609020204030204"/>
               </a:rPr>
               <a:t>{</a:t>
             </a:r>
             <a:endParaRPr sz="1800">
-              <a:latin typeface="Consolas"/>
-              <a:cs typeface="Consolas"/>
+              <a:latin typeface="Consolas" panose="020B0609020204030204"/>
+              <a:cs typeface="Consolas" panose="020B0609020204030204"/>
             </a:endParaRPr>
           </a:p>
           <a:p>
@@ -5174,14 +5131,14 @@
             </a:pPr>
             <a:r>
               <a:rPr sz="1800" dirty="0">
-                <a:latin typeface="Consolas"/>
-                <a:cs typeface="Consolas"/>
+                <a:latin typeface="Consolas" panose="020B0609020204030204"/>
+                <a:cs typeface="Consolas" panose="020B0609020204030204"/>
               </a:rPr>
               <a:t>transform:</a:t>
             </a:r>
             <a:endParaRPr sz="1800">
-              <a:latin typeface="Consolas"/>
-              <a:cs typeface="Consolas"/>
+              <a:latin typeface="Consolas" panose="020B0609020204030204"/>
+              <a:cs typeface="Consolas" panose="020B0609020204030204"/>
             </a:endParaRPr>
           </a:p>
           <a:p>
@@ -5195,60 +5152,60 @@
             </a:pPr>
             <a:r>
               <a:rPr sz="1800" dirty="0">
-                <a:latin typeface="Consolas"/>
-                <a:cs typeface="Consolas"/>
+                <a:latin typeface="Consolas" panose="020B0609020204030204"/>
+                <a:cs typeface="Consolas" panose="020B0609020204030204"/>
               </a:rPr>
               <a:t>}</a:t>
             </a:r>
             <a:endParaRPr sz="1800">
-              <a:latin typeface="Consolas"/>
-              <a:cs typeface="Consolas"/>
+              <a:latin typeface="Consolas" panose="020B0609020204030204"/>
+              <a:cs typeface="Consolas" panose="020B0609020204030204"/>
             </a:endParaRPr>
           </a:p>
           <a:p>
             <a:pPr marL="342265" marR="5080" indent="-342900">
               <a:lnSpc>
-                <a:spcPct val="120400"/>
+                <a:spcPct val="120000"/>
               </a:lnSpc>
             </a:pPr>
             <a:r>
               <a:rPr sz="1800" dirty="0">
-                <a:latin typeface="Consolas"/>
-                <a:cs typeface="Consolas"/>
+                <a:latin typeface="Consolas" panose="020B0609020204030204"/>
+                <a:cs typeface="Consolas" panose="020B0609020204030204"/>
               </a:rPr>
               <a:t>.twiceAsNice</a:t>
             </a:r>
             <a:r>
               <a:rPr sz="1800" spc="-100" dirty="0">
-                <a:latin typeface="Consolas"/>
-                <a:cs typeface="Consolas"/>
+                <a:latin typeface="Consolas" panose="020B0609020204030204"/>
+                <a:cs typeface="Consolas" panose="020B0609020204030204"/>
               </a:rPr>
               <a:t> </a:t>
             </a:r>
             <a:r>
               <a:rPr sz="1800" dirty="0">
-                <a:latin typeface="Consolas"/>
-                <a:cs typeface="Consolas"/>
+                <a:latin typeface="Consolas" panose="020B0609020204030204"/>
+                <a:cs typeface="Consolas" panose="020B0609020204030204"/>
               </a:rPr>
               <a:t>{ </a:t>
             </a:r>
             <a:r>
               <a:rPr sz="1800" spc="-975" dirty="0">
-                <a:latin typeface="Consolas"/>
-                <a:cs typeface="Consolas"/>
+                <a:latin typeface="Consolas" panose="020B0609020204030204"/>
+                <a:cs typeface="Consolas" panose="020B0609020204030204"/>
               </a:rPr>
               <a:t> </a:t>
             </a:r>
             <a:r>
               <a:rPr sz="1800" dirty="0">
-                <a:latin typeface="Consolas"/>
-                <a:cs typeface="Consolas"/>
+                <a:latin typeface="Consolas" panose="020B0609020204030204"/>
+                <a:cs typeface="Consolas" panose="020B0609020204030204"/>
               </a:rPr>
               <a:t>transform:</a:t>
             </a:r>
             <a:endParaRPr sz="1800">
-              <a:latin typeface="Consolas"/>
-              <a:cs typeface="Consolas"/>
+              <a:latin typeface="Consolas" panose="020B0609020204030204"/>
+              <a:cs typeface="Consolas" panose="020B0609020204030204"/>
             </a:endParaRPr>
           </a:p>
           <a:p>
@@ -5262,60 +5219,100 @@
             </a:pPr>
             <a:r>
               <a:rPr sz="1800" dirty="0">
-                <a:latin typeface="Consolas"/>
-                <a:cs typeface="Consolas"/>
+                <a:latin typeface="Consolas" panose="020B0609020204030204"/>
+                <a:cs typeface="Consolas" panose="020B0609020204030204"/>
               </a:rPr>
               <a:t>}</a:t>
             </a:r>
             <a:endParaRPr sz="1800">
-              <a:latin typeface="Consolas"/>
-              <a:cs typeface="Consolas"/>
+              <a:latin typeface="Consolas" panose="020B0609020204030204"/>
+              <a:cs typeface="Consolas" panose="020B0609020204030204"/>
             </a:endParaRPr>
           </a:p>
           <a:p>
             <a:pPr marL="342265" marR="5080" indent="-342900">
               <a:lnSpc>
-                <a:spcPct val="120400"/>
+                <a:spcPct val="120000"/>
               </a:lnSpc>
             </a:pPr>
             <a:r>
               <a:rPr sz="1800" dirty="0">
-                <a:latin typeface="Consolas"/>
-                <a:cs typeface="Consolas"/>
+                <a:latin typeface="Consolas" panose="020B0609020204030204"/>
+                <a:cs typeface="Consolas" panose="020B0609020204030204"/>
               </a:rPr>
               <a:t>.instantDiet</a:t>
             </a:r>
             <a:r>
               <a:rPr sz="1800" spc="-100" dirty="0">
-                <a:latin typeface="Consolas"/>
-                <a:cs typeface="Consolas"/>
+                <a:latin typeface="Consolas" panose="020B0609020204030204"/>
+                <a:cs typeface="Consolas" panose="020B0609020204030204"/>
               </a:rPr>
               <a:t> </a:t>
             </a:r>
             <a:r>
               <a:rPr sz="1800" dirty="0">
-                <a:latin typeface="Consolas"/>
-                <a:cs typeface="Consolas"/>
+                <a:latin typeface="Consolas" panose="020B0609020204030204"/>
+                <a:cs typeface="Consolas" panose="020B0609020204030204"/>
               </a:rPr>
               <a:t>{ </a:t>
             </a:r>
             <a:r>
               <a:rPr sz="1800" spc="-975" dirty="0">
-                <a:latin typeface="Consolas"/>
-                <a:cs typeface="Consolas"/>
+                <a:latin typeface="Consolas" panose="020B0609020204030204"/>
+                <a:cs typeface="Consolas" panose="020B0609020204030204"/>
               </a:rPr>
               <a:t> </a:t>
             </a:r>
+            <a:endParaRPr sz="1800" spc="-975" dirty="0">
+              <a:latin typeface="Consolas" panose="020B0609020204030204"/>
+              <a:cs typeface="Consolas" panose="020B0609020204030204"/>
+            </a:endParaRPr>
+          </a:p>
+          <a:p>
+            <a:pPr marL="342265" marR="5080" indent="-342900">
+              <a:lnSpc>
+                <a:spcPct val="120000"/>
+              </a:lnSpc>
+            </a:pPr>
+            <a:endParaRPr sz="1800" spc="-975" dirty="0">
+              <a:latin typeface="Consolas" panose="020B0609020204030204"/>
+              <a:cs typeface="Consolas" panose="020B0609020204030204"/>
+            </a:endParaRPr>
+          </a:p>
+          <a:p>
+            <a:pPr marL="342265" marR="5080" indent="-342900">
+              <a:lnSpc>
+                <a:spcPct val="120000"/>
+              </a:lnSpc>
+            </a:pPr>
+            <a:endParaRPr sz="1800" spc="-975" dirty="0">
+              <a:latin typeface="Consolas" panose="020B0609020204030204"/>
+              <a:cs typeface="Consolas" panose="020B0609020204030204"/>
+            </a:endParaRPr>
+          </a:p>
+          <a:p>
+            <a:pPr marL="342265" marR="5080" indent="-342900">
+              <a:lnSpc>
+                <a:spcPct val="120000"/>
+              </a:lnSpc>
+            </a:pPr>
+            <a:r>
+              <a:rPr lang="en-US" sz="1800" spc="-975" dirty="0">
+                <a:latin typeface="Consolas" panose="020B0609020204030204"/>
+                <a:cs typeface="Consolas" panose="020B0609020204030204"/>
+              </a:rPr>
+              <a:t>	</a:t>
+            </a:r>
             <a:r>
               <a:rPr sz="1800" dirty="0">
-                <a:latin typeface="Consolas"/>
-                <a:cs typeface="Consolas"/>
+                <a:latin typeface="Consolas" panose="020B0609020204030204"/>
+                <a:cs typeface="Consolas" panose="020B0609020204030204"/>
               </a:rPr>
               <a:t>transform:</a:t>
             </a:r>
             <a:endParaRPr sz="1800">
-              <a:latin typeface="Consolas"/>
-              <a:cs typeface="Consolas"/>
+              <a:latin typeface="Consolas" panose="020B0609020204030204"/>
+              <a:cs typeface="Consolas" panose="020B0609020204030204"/>
             </a:endParaRPr>
           </a:p>
           <a:p>
@@ -5329,14 +5326,14 @@
             </a:pPr>
             <a:r>
               <a:rPr sz="1800" dirty="0">
-                <a:latin typeface="Consolas"/>
-                <a:cs typeface="Consolas"/>
+                <a:latin typeface="Consolas" panose="020B0609020204030204"/>
+                <a:cs typeface="Consolas" panose="020B0609020204030204"/>
               </a:rPr>
               <a:t>}</a:t>
             </a:r>
             <a:endParaRPr sz="1800">
-              <a:latin typeface="Consolas"/>
-              <a:cs typeface="Consolas"/>
+              <a:latin typeface="Consolas" panose="020B0609020204030204"/>
+              <a:cs typeface="Consolas" panose="020B0609020204030204"/>
             </a:endParaRPr>
           </a:p>
         </p:txBody>
@@ -5349,7 +5346,7 @@
         </p:nvSpPr>
         <p:spPr>
           <a:xfrm>
-            <a:off x="1577339" y="4527803"/>
+            <a:off x="1577339" y="5289803"/>
             <a:ext cx="3623945" cy="1016000"/>
           </a:xfrm>
           <a:prstGeom prst="rect">
@@ -5372,28 +5369,28 @@
             </a:pPr>
             <a:r>
               <a:rPr sz="1800" dirty="0">
-                <a:latin typeface="Consolas"/>
-                <a:cs typeface="Consolas"/>
+                <a:latin typeface="Consolas" panose="020B0609020204030204"/>
+                <a:cs typeface="Consolas" panose="020B0609020204030204"/>
               </a:rPr>
               <a:t>.suddenlyTaller</a:t>
             </a:r>
             <a:r>
               <a:rPr sz="1800" spc="-65" dirty="0">
-                <a:latin typeface="Consolas"/>
-                <a:cs typeface="Consolas"/>
+                <a:latin typeface="Consolas" panose="020B0609020204030204"/>
+                <a:cs typeface="Consolas" panose="020B0609020204030204"/>
               </a:rPr>
               <a:t> </a:t>
             </a:r>
             <a:r>
               <a:rPr sz="1800" dirty="0">
-                <a:latin typeface="Consolas"/>
-                <a:cs typeface="Consolas"/>
+                <a:latin typeface="Consolas" panose="020B0609020204030204"/>
+                <a:cs typeface="Consolas" panose="020B0609020204030204"/>
               </a:rPr>
               <a:t>{</a:t>
             </a:r>
             <a:endParaRPr sz="1800">
-              <a:latin typeface="Consolas"/>
-              <a:cs typeface="Consolas"/>
+              <a:latin typeface="Consolas" panose="020B0609020204030204"/>
+              <a:cs typeface="Consolas" panose="020B0609020204030204"/>
             </a:endParaRPr>
           </a:p>
           <a:p>
@@ -5410,14 +5407,14 @@
             </a:pPr>
             <a:r>
               <a:rPr sz="1800" dirty="0">
-                <a:latin typeface="Consolas"/>
-                <a:cs typeface="Consolas"/>
+                <a:latin typeface="Consolas" panose="020B0609020204030204"/>
+                <a:cs typeface="Consolas" panose="020B0609020204030204"/>
               </a:rPr>
               <a:t>transform:	scaleY(1.25);</a:t>
             </a:r>
             <a:endParaRPr sz="1800">
-              <a:latin typeface="Consolas"/>
-              <a:cs typeface="Consolas"/>
+              <a:latin typeface="Consolas" panose="020B0609020204030204"/>
+              <a:cs typeface="Consolas" panose="020B0609020204030204"/>
             </a:endParaRPr>
           </a:p>
           <a:p>
@@ -5431,14 +5428,14 @@
             </a:pPr>
             <a:r>
               <a:rPr sz="1800" dirty="0">
-                <a:latin typeface="Consolas"/>
-                <a:cs typeface="Consolas"/>
+                <a:latin typeface="Consolas" panose="020B0609020204030204"/>
+                <a:cs typeface="Consolas" panose="020B0609020204030204"/>
               </a:rPr>
               <a:t>}</a:t>
             </a:r>
             <a:endParaRPr sz="1800">
-              <a:latin typeface="Consolas"/>
-              <a:cs typeface="Consolas"/>
+              <a:latin typeface="Consolas" panose="020B0609020204030204"/>
+              <a:cs typeface="Consolas" panose="020B0609020204030204"/>
             </a:endParaRPr>
           </a:p>
         </p:txBody>
@@ -5460,8 +5457,6 @@
           <a:p>
             <a:fld id="{B6F15528-21DE-4FAA-801E-634DDDAF4B2B}" type="slidenum">
               <a:rPr lang="en-US" smtClean="0"/>
-              <a:pPr/>
-              <a:t>8</a:t>
             </a:fld>
             <a:endParaRPr lang="en-US"/>
           </a:p>
@@ -5580,14 +5575,14 @@
             </a:pPr>
             <a:r>
               <a:rPr sz="2800" b="1" spc="-5" dirty="0">
-                <a:latin typeface="Arial"/>
-                <a:cs typeface="Arial"/>
+                <a:latin typeface="Arial" panose="020B0604020202020204"/>
+                <a:cs typeface="Arial" panose="020B0604020202020204"/>
               </a:rPr>
               <a:t>Translate</a:t>
             </a:r>
             <a:endParaRPr sz="2800">
-              <a:latin typeface="Arial"/>
-              <a:cs typeface="Arial"/>
+              <a:latin typeface="Arial" panose="020B0604020202020204"/>
+              <a:cs typeface="Arial" panose="020B0604020202020204"/>
             </a:endParaRPr>
           </a:p>
         </p:txBody>
@@ -5609,8 +5604,6 @@
           <a:p>
             <a:fld id="{B6F15528-21DE-4FAA-801E-634DDDAF4B2B}" type="slidenum">
               <a:rPr lang="en-US" smtClean="0"/>
-              <a:pPr/>
-              <a:t>9</a:t>
             </a:fld>
             <a:endParaRPr lang="en-US"/>
           </a:p>
@@ -5902,8 +5895,11 @@
       </a:bgFillStyleLst>
     </a:fmtScheme>
   </a:themeElements>
-  <a:objectDefaults/>
-  <a:extraClrSchemeLst/>
+  <a:extLst>
+    <a:ext uri="{05A4C25C-085E-4340-85A3-A5531E510DB2}">
+      <thm15:themeFamily xmlns:thm15="http://schemas.microsoft.com/office/thememl/2012/main" name="Office Theme" id="{62F939B6-93AF-4DB8-9C6B-D6C7DFDC589F}" vid="{4A3C46E8-61CC-4603-A589-7422A47A8E4A}"/>
+    </a:ext>
+  </a:extLst>
 </a:theme>
 </file>
 
@@ -6185,7 +6181,10 @@
       </a:bgFillStyleLst>
     </a:fmtScheme>
   </a:themeElements>
-  <a:objectDefaults/>
-  <a:extraClrSchemeLst/>
+  <a:extLst>
+    <a:ext uri="{05A4C25C-085E-4340-85A3-A5531E510DB2}">
+      <thm15:themeFamily xmlns:thm15="http://schemas.microsoft.com/office/thememl/2012/main" name="Office Theme" id="{62F939B6-93AF-4DB8-9C6B-D6C7DFDC589F}" vid="{4A3C46E8-61CC-4603-A589-7422A47A8E4A}"/>
+    </a:ext>
+  </a:extLst>
 </a:theme>
 </file>
</xml_diff>